<commit_message>
Updated PowerPoint and Settings
Created PowerPoint and made changes to the CG_settings.qml
</commit_message>
<xml_diff>
--- a/doc/PowerPoints/Sprint 3 Term 2/Winter 2015 S3 Presentation.pptx
+++ b/doc/PowerPoints/Sprint 3 Term 2/Winter 2015 S3 Presentation.pptx
@@ -120,7 +120,7 @@
   </p:defaultTextStyle>
   <p:extLst>
     <p:ext uri="{EFAFB233-063F-42B5-8137-9DF3F51BA10A}">
-      <p15:sldGuideLst xmlns:p15="http://schemas.microsoft.com/office/powerpoint/2012/main" xmlns="">
+      <p15:sldGuideLst xmlns="" xmlns:p15="http://schemas.microsoft.com/office/powerpoint/2012/main">
         <p15:guide id="1" orient="horz" pos="2160">
           <p15:clr>
             <a:srgbClr val="A4A3A4"/>
@@ -3694,46 +3694,78 @@
             <p:ph type="title"/>
           </p:nvPr>
         </p:nvSpPr>
-        <p:spPr/>
-        <p:txBody>
-          <a:bodyPr/>
-          <a:lstStyle/>
-          <a:p>
-            <a:r>
-              <a:rPr lang="en-US" dirty="0" smtClean="0"/>
-              <a:t>Code</a:t>
+        <p:spPr>
+          <a:xfrm>
+            <a:off x="448965" y="527605"/>
+            <a:ext cx="8229600" cy="1143000"/>
+          </a:xfrm>
+        </p:spPr>
+        <p:txBody>
+          <a:bodyPr/>
+          <a:lstStyle/>
+          <a:p>
+            <a:r>
+              <a:rPr lang="en-US" dirty="0" smtClean="0"/>
+              <a:t>Code – Settings page combo box</a:t>
             </a:r>
             <a:endParaRPr lang="en-US" dirty="0"/>
           </a:p>
         </p:txBody>
       </p:sp>
-      <p:sp>
-        <p:nvSpPr>
-          <p:cNvPr id="3" name="Content Placeholder 2"/>
-          <p:cNvSpPr>
-            <a:spLocks noGrp="1"/>
-          </p:cNvSpPr>
-          <p:nvPr>
-            <p:ph idx="1"/>
-          </p:nvPr>
-        </p:nvSpPr>
-        <p:spPr/>
-        <p:txBody>
-          <a:bodyPr/>
-          <a:lstStyle/>
-          <a:p>
-            <a:r>
-              <a:rPr lang="en-US" dirty="0"/>
-              <a:t>Created settings </a:t>
-            </a:r>
-            <a:r>
-              <a:rPr lang="en-US" dirty="0" smtClean="0"/>
-              <a:t>page</a:t>
-            </a:r>
-            <a:endParaRPr lang="en-US" dirty="0"/>
-          </a:p>
-        </p:txBody>
-      </p:sp>
+      <p:pic>
+        <p:nvPicPr>
+          <p:cNvPr id="1027" name="Picture 3"/>
+          <p:cNvPicPr>
+            <a:picLocks noChangeAspect="1" noChangeArrowheads="1"/>
+          </p:cNvPicPr>
+          <p:nvPr/>
+        </p:nvPicPr>
+        <p:blipFill>
+          <a:blip r:embed="rId2">
+            <a:extLst>
+              <a:ext uri="{28A0092B-C50C-407E-A947-70E740481C1C}">
+                <a14:useLocalDpi xmlns:a14="http://schemas.microsoft.com/office/drawing/2010/main" val="0"/>
+              </a:ext>
+            </a:extLst>
+          </a:blip>
+          <a:srcRect/>
+          <a:stretch>
+            <a:fillRect/>
+          </a:stretch>
+        </p:blipFill>
+        <p:spPr bwMode="auto">
+          <a:xfrm>
+            <a:off x="1212490" y="1326071"/>
+            <a:ext cx="6260905" cy="5039266"/>
+          </a:xfrm>
+          <a:prstGeom prst="rect">
+            <a:avLst/>
+          </a:prstGeom>
+          <a:noFill/>
+          <a:ln>
+            <a:noFill/>
+          </a:ln>
+          <a:extLst>
+            <a:ext uri="{909E8E84-426E-40DD-AFC4-6F175D3DCCD1}">
+              <a14:hiddenFill xmlns:a14="http://schemas.microsoft.com/office/drawing/2010/main">
+                <a:solidFill>
+                  <a:schemeClr val="accent1"/>
+                </a:solidFill>
+              </a14:hiddenFill>
+            </a:ext>
+            <a:ext uri="{91240B29-F687-4F45-9708-019B960494DF}">
+              <a14:hiddenLine xmlns:a14="http://schemas.microsoft.com/office/drawing/2010/main" w="9525">
+                <a:solidFill>
+                  <a:schemeClr val="tx1"/>
+                </a:solidFill>
+                <a:miter lim="800000"/>
+                <a:headEnd/>
+                <a:tailEnd/>
+              </a14:hiddenLine>
+            </a:ext>
+          </a:extLst>
+        </p:spPr>
+      </p:pic>
     </p:spTree>
     <p:extLst>
       <p:ext uri="{BB962C8B-B14F-4D97-AF65-F5344CB8AC3E}">
@@ -3744,6 +3776,13 @@
   <p:clrMapOvr>
     <a:masterClrMapping/>
   </p:clrMapOvr>
+  <p:timing>
+    <p:tnLst>
+      <p:par>
+        <p:cTn id="1" dur="indefinite" restart="never" nodeType="tmRoot"/>
+      </p:par>
+    </p:tnLst>
+  </p:timing>
 </p:sld>
 </file>
 
@@ -3824,6 +3863,13 @@
   <p:clrMapOvr>
     <a:masterClrMapping/>
   </p:clrMapOvr>
+  <p:timing>
+    <p:tnLst>
+      <p:par>
+        <p:cTn id="1" dur="indefinite" restart="never" nodeType="tmRoot"/>
+      </p:par>
+    </p:tnLst>
+  </p:timing>
 </p:sld>
 </file>
 
@@ -3947,19 +3993,14 @@
           <a:p>
             <a:r>
               <a:rPr lang="en-US" dirty="0" smtClean="0"/>
-              <a:t>Move Validation</a:t>
-            </a:r>
-          </a:p>
-          <a:p>
-            <a:r>
-              <a:rPr lang="en-US" dirty="0" smtClean="0"/>
-              <a:t>Chess Clocks</a:t>
-            </a:r>
-          </a:p>
-          <a:p>
-            <a:r>
-              <a:rPr lang="en-US" dirty="0" smtClean="0"/>
-              <a:t>Algebraic Notation Display</a:t>
+              <a:t>Client to interface with our server (players can play against each other)</a:t>
+            </a:r>
+            <a:endParaRPr lang="en-US" dirty="0" smtClean="0"/>
+          </a:p>
+          <a:p>
+            <a:r>
+              <a:rPr lang="en-US" dirty="0" smtClean="0"/>
+              <a:t>Customized piece sets</a:t>
             </a:r>
           </a:p>
         </p:txBody>
@@ -4216,13 +4257,8 @@
           <a:p>
             <a:r>
               <a:rPr lang="en-US" dirty="0" smtClean="0"/>
-              <a:t>What we </a:t>
-            </a:r>
-            <a:r>
-              <a:rPr lang="en-US" dirty="0" smtClean="0"/>
-              <a:t>accomplished</a:t>
-            </a:r>
-            <a:endParaRPr lang="en-US" dirty="0" smtClean="0"/>
+              <a:t>What we accomplished</a:t>
+            </a:r>
           </a:p>
           <a:p>
             <a:r>
@@ -4233,13 +4269,8 @@
           <a:p>
             <a:r>
               <a:rPr lang="en-US" dirty="0" smtClean="0"/>
-              <a:t>Next sprint’s </a:t>
-            </a:r>
-            <a:r>
-              <a:rPr lang="en-US" dirty="0" smtClean="0"/>
-              <a:t>plans</a:t>
-            </a:r>
-            <a:endParaRPr lang="en-US" dirty="0" smtClean="0"/>
+              <a:t>Next sprint’s plans</a:t>
+            </a:r>
           </a:p>
           <a:p>
             <a:r>
@@ -4374,7 +4405,6 @@
               <a:rPr lang="en-US" dirty="0" smtClean="0"/>
               <a:t>ove history</a:t>
             </a:r>
-            <a:endParaRPr lang="en-US" dirty="0" smtClean="0"/>
           </a:p>
           <a:p>
             <a:r>
@@ -4387,7 +4417,6 @@
               <a:rPr lang="en-US" dirty="0" smtClean="0"/>
               <a:t>Updated presentation layer layout</a:t>
             </a:r>
-            <a:endParaRPr lang="en-US" dirty="0" smtClean="0"/>
           </a:p>
           <a:p>
             <a:r>
@@ -4746,6 +4775,13 @@
   <p:clrMapOvr>
     <a:masterClrMapping/>
   </p:clrMapOvr>
+  <p:timing>
+    <p:tnLst>
+      <p:par>
+        <p:cTn id="1" dur="indefinite" restart="never" nodeType="tmRoot"/>
+      </p:par>
+    </p:tnLst>
+  </p:timing>
 </p:sld>
 </file>
 
@@ -4893,6 +4929,13 @@
   <p:clrMapOvr>
     <a:masterClrMapping/>
   </p:clrMapOvr>
+  <p:timing>
+    <p:tnLst>
+      <p:par>
+        <p:cTn id="1" dur="indefinite" restart="never" nodeType="tmRoot"/>
+      </p:par>
+    </p:tnLst>
+  </p:timing>
 </p:sld>
 </file>
 
@@ -4973,6 +5016,13 @@
   <p:clrMapOvr>
     <a:masterClrMapping/>
   </p:clrMapOvr>
+  <p:timing>
+    <p:tnLst>
+      <p:par>
+        <p:cTn id="1" dur="indefinite" restart="never" nodeType="tmRoot"/>
+      </p:par>
+    </p:tnLst>
+  </p:timing>
 </p:sld>
 </file>
 

</xml_diff>